<commit_message>
Last update - 1/12/20 20:55
</commit_message>
<xml_diff>
--- a/Assignment2/מסכים מסכים.pptx
+++ b/Assignment2/מסכים מסכים.pptx
@@ -115,6 +115,11 @@
       </a:defRPr>
     </a:lvl9pPr>
   </p:defaultTextStyle>
+  <p:extLst>
+    <p:ext uri="{EFAFB233-063F-42B5-8137-9DF3F51BA10A}">
+      <p15:sldGuideLst xmlns:p15="http://schemas.microsoft.com/office/powerpoint/2012/main"/>
+    </p:ext>
+  </p:extLst>
 </p:presentation>
 </file>
 
@@ -267,7 +272,7 @@
           <a:p>
             <a:fld id="{0D4BCF9B-D56B-4513-AD67-65C985E0B0F7}" type="datetimeFigureOut">
               <a:rPr lang="en-US" smtClean="0"/>
-              <a:t>11/30/2020</a:t>
+              <a:t>1/12/2020</a:t>
             </a:fld>
             <a:endParaRPr lang="en-US"/>
           </a:p>
@@ -467,7 +472,7 @@
           <a:p>
             <a:fld id="{0D4BCF9B-D56B-4513-AD67-65C985E0B0F7}" type="datetimeFigureOut">
               <a:rPr lang="en-US" smtClean="0"/>
-              <a:t>11/30/2020</a:t>
+              <a:t>1/12/2020</a:t>
             </a:fld>
             <a:endParaRPr lang="en-US"/>
           </a:p>
@@ -677,7 +682,7 @@
           <a:p>
             <a:fld id="{0D4BCF9B-D56B-4513-AD67-65C985E0B0F7}" type="datetimeFigureOut">
               <a:rPr lang="en-US" smtClean="0"/>
-              <a:t>11/30/2020</a:t>
+              <a:t>1/12/2020</a:t>
             </a:fld>
             <a:endParaRPr lang="en-US"/>
           </a:p>
@@ -877,7 +882,7 @@
           <a:p>
             <a:fld id="{0D4BCF9B-D56B-4513-AD67-65C985E0B0F7}" type="datetimeFigureOut">
               <a:rPr lang="en-US" smtClean="0"/>
-              <a:t>11/30/2020</a:t>
+              <a:t>1/12/2020</a:t>
             </a:fld>
             <a:endParaRPr lang="en-US"/>
           </a:p>
@@ -1153,7 +1158,7 @@
           <a:p>
             <a:fld id="{0D4BCF9B-D56B-4513-AD67-65C985E0B0F7}" type="datetimeFigureOut">
               <a:rPr lang="en-US" smtClean="0"/>
-              <a:t>11/30/2020</a:t>
+              <a:t>1/12/2020</a:t>
             </a:fld>
             <a:endParaRPr lang="en-US"/>
           </a:p>
@@ -1421,7 +1426,7 @@
           <a:p>
             <a:fld id="{0D4BCF9B-D56B-4513-AD67-65C985E0B0F7}" type="datetimeFigureOut">
               <a:rPr lang="en-US" smtClean="0"/>
-              <a:t>11/30/2020</a:t>
+              <a:t>1/12/2020</a:t>
             </a:fld>
             <a:endParaRPr lang="en-US"/>
           </a:p>
@@ -1836,7 +1841,7 @@
           <a:p>
             <a:fld id="{0D4BCF9B-D56B-4513-AD67-65C985E0B0F7}" type="datetimeFigureOut">
               <a:rPr lang="en-US" smtClean="0"/>
-              <a:t>11/30/2020</a:t>
+              <a:t>1/12/2020</a:t>
             </a:fld>
             <a:endParaRPr lang="en-US"/>
           </a:p>
@@ -1978,7 +1983,7 @@
           <a:p>
             <a:fld id="{0D4BCF9B-D56B-4513-AD67-65C985E0B0F7}" type="datetimeFigureOut">
               <a:rPr lang="en-US" smtClean="0"/>
-              <a:t>11/30/2020</a:t>
+              <a:t>1/12/2020</a:t>
             </a:fld>
             <a:endParaRPr lang="en-US"/>
           </a:p>
@@ -2091,7 +2096,7 @@
           <a:p>
             <a:fld id="{0D4BCF9B-D56B-4513-AD67-65C985E0B0F7}" type="datetimeFigureOut">
               <a:rPr lang="en-US" smtClean="0"/>
-              <a:t>11/30/2020</a:t>
+              <a:t>1/12/2020</a:t>
             </a:fld>
             <a:endParaRPr lang="en-US"/>
           </a:p>
@@ -2404,7 +2409,7 @@
           <a:p>
             <a:fld id="{0D4BCF9B-D56B-4513-AD67-65C985E0B0F7}" type="datetimeFigureOut">
               <a:rPr lang="en-US" smtClean="0"/>
-              <a:t>11/30/2020</a:t>
+              <a:t>1/12/2020</a:t>
             </a:fld>
             <a:endParaRPr lang="en-US"/>
           </a:p>
@@ -2693,7 +2698,7 @@
           <a:p>
             <a:fld id="{0D4BCF9B-D56B-4513-AD67-65C985E0B0F7}" type="datetimeFigureOut">
               <a:rPr lang="en-US" smtClean="0"/>
-              <a:t>11/30/2020</a:t>
+              <a:t>1/12/2020</a:t>
             </a:fld>
             <a:endParaRPr lang="en-US"/>
           </a:p>
@@ -2936,7 +2941,7 @@
           <a:p>
             <a:fld id="{0D4BCF9B-D56B-4513-AD67-65C985E0B0F7}" type="datetimeFigureOut">
               <a:rPr lang="en-US" smtClean="0"/>
-              <a:t>11/30/2020</a:t>
+              <a:t>1/12/2020</a:t>
             </a:fld>
             <a:endParaRPr lang="en-US"/>
           </a:p>
@@ -3757,20 +3762,12 @@
           <a:p>
             <a:pPr algn="ctr"/>
             <a:r>
-              <a:rPr lang="en-US" dirty="0" err="1">
-                <a:solidFill>
-                  <a:schemeClr val="tx1"/>
-                </a:solidFill>
-              </a:rPr>
-              <a:t>Welome</a:t>
-            </a:r>
-            <a:r>
               <a:rPr lang="en-US" dirty="0">
                 <a:solidFill>
                   <a:schemeClr val="tx1"/>
                 </a:solidFill>
               </a:rPr>
-              <a:t> screen ICON</a:t>
+              <a:t>Welcome screen ICON</a:t>
             </a:r>
           </a:p>
         </p:txBody>
@@ -3898,8 +3895,21 @@
                   <a:schemeClr val="tx1"/>
                 </a:solidFill>
               </a:rPr>
-              <a:t>Have Oder</a:t>
-            </a:r>
+              <a:t>Have </a:t>
+            </a:r>
+            <a:r>
+              <a:rPr lang="en-US" dirty="0" err="1">
+                <a:solidFill>
+                  <a:schemeClr val="tx1"/>
+                </a:solidFill>
+              </a:rPr>
+              <a:t>Odrer</a:t>
+            </a:r>
+            <a:endParaRPr lang="en-US" dirty="0">
+              <a:solidFill>
+                <a:schemeClr val="tx1"/>
+              </a:solidFill>
+            </a:endParaRPr>
           </a:p>
         </p:txBody>
       </p:sp>

</xml_diff>